<commit_message>
Documentation: Pushing final changes
</commit_message>
<xml_diff>
--- a/Summers_2013/NPL/holyText/Overview.pptx
+++ b/Summers_2013/NPL/holyText/Overview.pptx
@@ -8,6 +8,7 @@
     <p:sldId id="256" r:id="rId2"/>
     <p:sldId id="257" r:id="rId3"/>
     <p:sldId id="258" r:id="rId4"/>
+    <p:sldId id="259" r:id="rId5"/>
   </p:sldIdLst>
   <p:sldSz cx="12192000" cy="6858000"/>
   <p:notesSz cx="6858000" cy="9144000"/>
@@ -106,6 +107,28 @@
       </a:defRPr>
     </a:lvl9pPr>
   </p:defaultTextStyle>
+  <p:extLst>
+    <p:ext uri="{521415D9-36F7-43E2-AB2F-B90AF26B5E84}">
+      <p14:sectionLst xmlns:p14="http://schemas.microsoft.com/office/powerpoint/2010/main">
+        <p14:section name="Default Section" id="{1644E8A0-DB7A-402D-A51F-5E07E31648E2}">
+          <p14:sldIdLst>
+            <p14:sldId id="256"/>
+          </p14:sldIdLst>
+        </p14:section>
+        <p14:section name="Contents" id="{55729A6F-C1EB-40E7-B4BE-A9819216DCD6}">
+          <p14:sldIdLst>
+            <p14:sldId id="257"/>
+            <p14:sldId id="258"/>
+          </p14:sldIdLst>
+        </p14:section>
+        <p14:section name="Inspiration" id="{2476BE1C-09A5-4C6C-A1E2-9844ED58BFA5}">
+          <p14:sldIdLst>
+            <p14:sldId id="259"/>
+          </p14:sldIdLst>
+        </p14:section>
+      </p14:sectionLst>
+    </p:ext>
+  </p:extLst>
 </p:presentation>
 </file>
 
@@ -3005,24 +3028,8 @@
           <a:lstStyle/>
           <a:p>
             <a:r>
-              <a:rPr lang="en-GB" dirty="0"/>
-              <a:t>f</a:t>
-            </a:r>
-            <a:r>
               <a:rPr lang="en-GB" dirty="0" smtClean="0"/>
-              <a:t>rom </a:t>
-            </a:r>
-            <a:r>
-              <a:rPr lang="en-GB" dirty="0" err="1" smtClean="0"/>
-              <a:t>nanometers</a:t>
-            </a:r>
-            <a:r>
-              <a:rPr lang="en-GB" dirty="0" smtClean="0"/>
-              <a:t> to </a:t>
-            </a:r>
-            <a:r>
-              <a:rPr lang="en-GB" dirty="0" err="1" smtClean="0"/>
-              <a:t>centimeters</a:t>
+              <a:t>Expanding nanometres to centimetres</a:t>
             </a:r>
             <a:endParaRPr lang="en-GB" dirty="0"/>
           </a:p>
@@ -3185,10 +3192,9 @@
           </a:p>
           <a:p>
             <a:r>
-              <a:rPr lang="en-GB" smtClean="0"/>
+              <a:rPr lang="en-GB" dirty="0" smtClean="0"/>
               <a:t>Permutations</a:t>
             </a:r>
-            <a:endParaRPr lang="en-GB" dirty="0" smtClean="0"/>
           </a:p>
           <a:p>
             <a:r>
@@ -3209,6 +3215,78 @@
     <p:extLst>
       <p:ext uri="{BB962C8B-B14F-4D97-AF65-F5344CB8AC3E}">
         <p14:creationId xmlns:p14="http://schemas.microsoft.com/office/powerpoint/2010/main" val="3341062927"/>
+      </p:ext>
+    </p:extLst>
+  </p:cSld>
+  <p:clrMapOvr>
+    <a:masterClrMapping/>
+  </p:clrMapOvr>
+</p:sld>
+</file>
+
+<file path=ppt/slides/slide4.xml><?xml version="1.0" encoding="utf-8"?>
+<p:sld xmlns:a="http://schemas.openxmlformats.org/drawingml/2006/main" xmlns:r="http://schemas.openxmlformats.org/officeDocument/2006/relationships" xmlns:p="http://schemas.openxmlformats.org/presentationml/2006/main">
+  <p:cSld>
+    <p:spTree>
+      <p:nvGrpSpPr>
+        <p:cNvPr id="1" name=""/>
+        <p:cNvGrpSpPr/>
+        <p:nvPr/>
+      </p:nvGrpSpPr>
+      <p:grpSpPr>
+        <a:xfrm>
+          <a:off x="0" y="0"/>
+          <a:ext cx="0" cy="0"/>
+          <a:chOff x="0" y="0"/>
+          <a:chExt cx="0" cy="0"/>
+        </a:xfrm>
+      </p:grpSpPr>
+      <p:sp>
+        <p:nvSpPr>
+          <p:cNvPr id="2" name="Title 1"/>
+          <p:cNvSpPr>
+            <a:spLocks noGrp="1"/>
+          </p:cNvSpPr>
+          <p:nvPr>
+            <p:ph type="title"/>
+          </p:nvPr>
+        </p:nvSpPr>
+        <p:spPr/>
+        <p:txBody>
+          <a:bodyPr/>
+          <a:lstStyle/>
+          <a:p>
+            <a:r>
+              <a:rPr lang="en-GB" dirty="0" smtClean="0"/>
+              <a:t>Inspiration</a:t>
+            </a:r>
+            <a:endParaRPr lang="en-GB" dirty="0"/>
+          </a:p>
+        </p:txBody>
+      </p:sp>
+      <p:sp>
+        <p:nvSpPr>
+          <p:cNvPr id="3" name="Text Placeholder 2"/>
+          <p:cNvSpPr>
+            <a:spLocks noGrp="1"/>
+          </p:cNvSpPr>
+          <p:nvPr>
+            <p:ph type="body" idx="1"/>
+          </p:nvPr>
+        </p:nvSpPr>
+        <p:spPr/>
+        <p:txBody>
+          <a:bodyPr/>
+          <a:lstStyle/>
+          <a:p>
+            <a:endParaRPr lang="en-GB" dirty="0"/>
+          </a:p>
+        </p:txBody>
+      </p:sp>
+    </p:spTree>
+    <p:extLst>
+      <p:ext uri="{BB962C8B-B14F-4D97-AF65-F5344CB8AC3E}">
+        <p14:creationId xmlns:p14="http://schemas.microsoft.com/office/powerpoint/2010/main" val="268508378"/>
       </p:ext>
     </p:extLst>
   </p:cSld>

</xml_diff>